<commit_message>
modified : certificate generator
</commit_message>
<xml_diff>
--- a/app/cert_gen_sen_app_backend/certificate_data/certificate-template/certificate_of_completion.pptx
+++ b/app/cert_gen_sen_app_backend/certificate_data/certificate-template/certificate_of_completion.pptx
@@ -46,7 +46,7 @@
             <a:pPr>
               <a:defRPr/>
             </a:pPr>
-            <a:fld id="{6C10D37A-72AC-4FCD-B6BA-49C3AEEAD0F7}" type="slidenum">
+            <a:fld id="{9941A90D-FD69-4500-9F9C-4E5FF3E19ED9}" type="slidenum">
               <a:rPr/>
               <a:t/>
             </a:fld>
@@ -81,7 +81,7 @@
       </p:grpSpPr>
       <p:sp>
         <p:nvSpPr>
-          <p:cNvPr id="24" name="PlaceHolder 1"/>
+          <p:cNvPr id="22" name="PlaceHolder 1"/>
           <p:cNvSpPr>
             <a:spLocks noGrp="1"/>
           </p:cNvSpPr>
@@ -119,7 +119,7 @@
       </p:sp>
       <p:sp>
         <p:nvSpPr>
-          <p:cNvPr id="25" name="PlaceHolder 2"/>
+          <p:cNvPr id="23" name="PlaceHolder 2"/>
           <p:cNvSpPr>
             <a:spLocks noGrp="1"/>
           </p:cNvSpPr>
@@ -156,7 +156,7 @@
       </p:sp>
       <p:sp>
         <p:nvSpPr>
-          <p:cNvPr id="26" name="PlaceHolder 3"/>
+          <p:cNvPr id="24" name="PlaceHolder 3"/>
           <p:cNvSpPr>
             <a:spLocks noGrp="1"/>
           </p:cNvSpPr>
@@ -208,7 +208,7 @@
             <a:pPr>
               <a:defRPr/>
             </a:pPr>
-            <a:fld id="{57243067-7D2C-4500-8ADA-B911EC2EC9E9}" type="slidenum">
+            <a:fld id="{8E7BF9E7-1E3A-4362-ABA5-BF36FB59DA1E}" type="slidenum">
               <a:rPr/>
               <a:t/>
             </a:fld>
@@ -243,7 +243,7 @@
       </p:grpSpPr>
       <p:sp>
         <p:nvSpPr>
-          <p:cNvPr id="27" name="PlaceHolder 1"/>
+          <p:cNvPr id="25" name="PlaceHolder 1"/>
           <p:cNvSpPr>
             <a:spLocks noGrp="1"/>
           </p:cNvSpPr>
@@ -281,7 +281,7 @@
       </p:sp>
       <p:sp>
         <p:nvSpPr>
-          <p:cNvPr id="28" name="PlaceHolder 2"/>
+          <p:cNvPr id="26" name="PlaceHolder 2"/>
           <p:cNvSpPr>
             <a:spLocks noGrp="1"/>
           </p:cNvSpPr>
@@ -318,7 +318,7 @@
       </p:sp>
       <p:sp>
         <p:nvSpPr>
-          <p:cNvPr id="29" name="PlaceHolder 3"/>
+          <p:cNvPr id="27" name="PlaceHolder 3"/>
           <p:cNvSpPr>
             <a:spLocks noGrp="1"/>
           </p:cNvSpPr>
@@ -355,7 +355,7 @@
       </p:sp>
       <p:sp>
         <p:nvSpPr>
-          <p:cNvPr id="30" name="PlaceHolder 4"/>
+          <p:cNvPr id="28" name="PlaceHolder 4"/>
           <p:cNvSpPr>
             <a:spLocks noGrp="1"/>
           </p:cNvSpPr>
@@ -392,7 +392,7 @@
       </p:sp>
       <p:sp>
         <p:nvSpPr>
-          <p:cNvPr id="31" name="PlaceHolder 5"/>
+          <p:cNvPr id="29" name="PlaceHolder 5"/>
           <p:cNvSpPr>
             <a:spLocks noGrp="1"/>
           </p:cNvSpPr>
@@ -444,7 +444,7 @@
             <a:pPr>
               <a:defRPr/>
             </a:pPr>
-            <a:fld id="{6C50AB0C-ACEC-4163-A494-4DCD47166430}" type="slidenum">
+            <a:fld id="{14708C6A-4798-423A-880F-B8F1DFC9C8EB}" type="slidenum">
               <a:rPr/>
               <a:t/>
             </a:fld>
@@ -479,7 +479,7 @@
       </p:grpSpPr>
       <p:sp>
         <p:nvSpPr>
-          <p:cNvPr id="32" name="PlaceHolder 1"/>
+          <p:cNvPr id="30" name="PlaceHolder 1"/>
           <p:cNvSpPr>
             <a:spLocks noGrp="1"/>
           </p:cNvSpPr>
@@ -517,7 +517,7 @@
       </p:sp>
       <p:sp>
         <p:nvSpPr>
-          <p:cNvPr id="33" name="PlaceHolder 2"/>
+          <p:cNvPr id="31" name="PlaceHolder 2"/>
           <p:cNvSpPr>
             <a:spLocks noGrp="1"/>
           </p:cNvSpPr>
@@ -554,7 +554,7 @@
       </p:sp>
       <p:sp>
         <p:nvSpPr>
-          <p:cNvPr id="34" name="PlaceHolder 3"/>
+          <p:cNvPr id="32" name="PlaceHolder 3"/>
           <p:cNvSpPr>
             <a:spLocks noGrp="1"/>
           </p:cNvSpPr>
@@ -591,7 +591,7 @@
       </p:sp>
       <p:sp>
         <p:nvSpPr>
-          <p:cNvPr id="35" name="PlaceHolder 4"/>
+          <p:cNvPr id="33" name="PlaceHolder 4"/>
           <p:cNvSpPr>
             <a:spLocks noGrp="1"/>
           </p:cNvSpPr>
@@ -628,7 +628,7 @@
       </p:sp>
       <p:sp>
         <p:nvSpPr>
-          <p:cNvPr id="36" name="PlaceHolder 5"/>
+          <p:cNvPr id="34" name="PlaceHolder 5"/>
           <p:cNvSpPr>
             <a:spLocks noGrp="1"/>
           </p:cNvSpPr>
@@ -665,7 +665,7 @@
       </p:sp>
       <p:sp>
         <p:nvSpPr>
-          <p:cNvPr id="37" name="PlaceHolder 6"/>
+          <p:cNvPr id="35" name="PlaceHolder 6"/>
           <p:cNvSpPr>
             <a:spLocks noGrp="1"/>
           </p:cNvSpPr>
@@ -702,7 +702,7 @@
       </p:sp>
       <p:sp>
         <p:nvSpPr>
-          <p:cNvPr id="38" name="PlaceHolder 7"/>
+          <p:cNvPr id="36" name="PlaceHolder 7"/>
           <p:cNvSpPr>
             <a:spLocks noGrp="1"/>
           </p:cNvSpPr>
@@ -754,7 +754,7 @@
             <a:pPr>
               <a:defRPr/>
             </a:pPr>
-            <a:fld id="{0701CF18-7CDE-43EB-89A6-9964C3B78291}" type="slidenum">
+            <a:fld id="{4E7B5562-01CD-4B01-9D19-3A92295D80C3}" type="slidenum">
               <a:rPr/>
               <a:t/>
             </a:fld>
@@ -789,7 +789,7 @@
       </p:grpSpPr>
       <p:sp>
         <p:nvSpPr>
-          <p:cNvPr id="3" name="PlaceHolder 1"/>
+          <p:cNvPr id="1" name="PlaceHolder 1"/>
           <p:cNvSpPr>
             <a:spLocks noGrp="1"/>
           </p:cNvSpPr>
@@ -827,7 +827,7 @@
       </p:sp>
       <p:sp>
         <p:nvSpPr>
-          <p:cNvPr id="4" name="PlaceHolder 2"/>
+          <p:cNvPr id="2" name="PlaceHolder 2"/>
           <p:cNvSpPr>
             <a:spLocks noGrp="1"/>
           </p:cNvSpPr>
@@ -880,7 +880,7 @@
             <a:pPr>
               <a:defRPr/>
             </a:pPr>
-            <a:fld id="{9A9C07F3-1401-4A41-8F0C-6071CFB04CD5}" type="slidenum">
+            <a:fld id="{FDE86794-F3F4-453C-B18A-68612C5D0ABE}" type="slidenum">
               <a:rPr/>
               <a:t/>
             </a:fld>
@@ -915,7 +915,7 @@
       </p:grpSpPr>
       <p:sp>
         <p:nvSpPr>
-          <p:cNvPr id="5" name="PlaceHolder 1"/>
+          <p:cNvPr id="3" name="PlaceHolder 1"/>
           <p:cNvSpPr>
             <a:spLocks noGrp="1"/>
           </p:cNvSpPr>
@@ -953,7 +953,7 @@
       </p:sp>
       <p:sp>
         <p:nvSpPr>
-          <p:cNvPr id="6" name="PlaceHolder 2"/>
+          <p:cNvPr id="4" name="PlaceHolder 2"/>
           <p:cNvSpPr>
             <a:spLocks noGrp="1"/>
           </p:cNvSpPr>
@@ -1005,7 +1005,7 @@
             <a:pPr>
               <a:defRPr/>
             </a:pPr>
-            <a:fld id="{7DC90813-D96C-4CC9-9515-1F9FC9CA52CC}" type="slidenum">
+            <a:fld id="{60BAE224-67F8-4119-8434-688263014837}" type="slidenum">
               <a:rPr/>
               <a:t/>
             </a:fld>
@@ -1040,7 +1040,7 @@
       </p:grpSpPr>
       <p:sp>
         <p:nvSpPr>
-          <p:cNvPr id="7" name="PlaceHolder 1"/>
+          <p:cNvPr id="5" name="PlaceHolder 1"/>
           <p:cNvSpPr>
             <a:spLocks noGrp="1"/>
           </p:cNvSpPr>
@@ -1078,7 +1078,7 @@
       </p:sp>
       <p:sp>
         <p:nvSpPr>
-          <p:cNvPr id="8" name="PlaceHolder 2"/>
+          <p:cNvPr id="6" name="PlaceHolder 2"/>
           <p:cNvSpPr>
             <a:spLocks noGrp="1"/>
           </p:cNvSpPr>
@@ -1115,7 +1115,7 @@
       </p:sp>
       <p:sp>
         <p:nvSpPr>
-          <p:cNvPr id="9" name="PlaceHolder 3"/>
+          <p:cNvPr id="7" name="PlaceHolder 3"/>
           <p:cNvSpPr>
             <a:spLocks noGrp="1"/>
           </p:cNvSpPr>
@@ -1167,7 +1167,7 @@
             <a:pPr>
               <a:defRPr/>
             </a:pPr>
-            <a:fld id="{A2DC49E3-DF94-4285-97C9-80B444498E0A}" type="slidenum">
+            <a:fld id="{1B7C789E-2441-4E10-8D87-69EB45AA6D9C}" type="slidenum">
               <a:rPr/>
               <a:t/>
             </a:fld>
@@ -1202,7 +1202,7 @@
       </p:grpSpPr>
       <p:sp>
         <p:nvSpPr>
-          <p:cNvPr id="10" name="PlaceHolder 1"/>
+          <p:cNvPr id="8" name="PlaceHolder 1"/>
           <p:cNvSpPr>
             <a:spLocks noGrp="1"/>
           </p:cNvSpPr>
@@ -1255,7 +1255,7 @@
             <a:pPr>
               <a:defRPr/>
             </a:pPr>
-            <a:fld id="{46B549D4-B431-494F-A455-D69970B6F157}" type="slidenum">
+            <a:fld id="{867C4D7A-2162-4FE8-BC59-C72312D29BB7}" type="slidenum">
               <a:rPr/>
               <a:t/>
             </a:fld>
@@ -1290,7 +1290,7 @@
       </p:grpSpPr>
       <p:sp>
         <p:nvSpPr>
-          <p:cNvPr id="11" name="PlaceHolder 1"/>
+          <p:cNvPr id="9" name="PlaceHolder 1"/>
           <p:cNvSpPr>
             <a:spLocks noGrp="1"/>
           </p:cNvSpPr>
@@ -1343,7 +1343,7 @@
             <a:pPr>
               <a:defRPr/>
             </a:pPr>
-            <a:fld id="{4F3DDDFE-0990-4F0F-AF4C-B612C629DC05}" type="slidenum">
+            <a:fld id="{5063E7ED-B2D4-40A1-BCA6-1B71E7C8A1DC}" type="slidenum">
               <a:rPr/>
               <a:t/>
             </a:fld>
@@ -1378,7 +1378,7 @@
       </p:grpSpPr>
       <p:sp>
         <p:nvSpPr>
-          <p:cNvPr id="12" name="PlaceHolder 1"/>
+          <p:cNvPr id="10" name="PlaceHolder 1"/>
           <p:cNvSpPr>
             <a:spLocks noGrp="1"/>
           </p:cNvSpPr>
@@ -1416,7 +1416,7 @@
       </p:sp>
       <p:sp>
         <p:nvSpPr>
-          <p:cNvPr id="13" name="PlaceHolder 2"/>
+          <p:cNvPr id="11" name="PlaceHolder 2"/>
           <p:cNvSpPr>
             <a:spLocks noGrp="1"/>
           </p:cNvSpPr>
@@ -1453,7 +1453,7 @@
       </p:sp>
       <p:sp>
         <p:nvSpPr>
-          <p:cNvPr id="14" name="PlaceHolder 3"/>
+          <p:cNvPr id="12" name="PlaceHolder 3"/>
           <p:cNvSpPr>
             <a:spLocks noGrp="1"/>
           </p:cNvSpPr>
@@ -1490,7 +1490,7 @@
       </p:sp>
       <p:sp>
         <p:nvSpPr>
-          <p:cNvPr id="15" name="PlaceHolder 4"/>
+          <p:cNvPr id="13" name="PlaceHolder 4"/>
           <p:cNvSpPr>
             <a:spLocks noGrp="1"/>
           </p:cNvSpPr>
@@ -1542,7 +1542,7 @@
             <a:pPr>
               <a:defRPr/>
             </a:pPr>
-            <a:fld id="{A10E8C78-4DCC-42FF-8DE7-3B89479934F5}" type="slidenum">
+            <a:fld id="{9B7D0471-A22A-485D-B65B-14D5FB701A1E}" type="slidenum">
               <a:rPr/>
               <a:t/>
             </a:fld>
@@ -1577,7 +1577,7 @@
       </p:grpSpPr>
       <p:sp>
         <p:nvSpPr>
-          <p:cNvPr id="16" name="PlaceHolder 1"/>
+          <p:cNvPr id="14" name="PlaceHolder 1"/>
           <p:cNvSpPr>
             <a:spLocks noGrp="1"/>
           </p:cNvSpPr>
@@ -1615,7 +1615,7 @@
       </p:sp>
       <p:sp>
         <p:nvSpPr>
-          <p:cNvPr id="17" name="PlaceHolder 2"/>
+          <p:cNvPr id="15" name="PlaceHolder 2"/>
           <p:cNvSpPr>
             <a:spLocks noGrp="1"/>
           </p:cNvSpPr>
@@ -1652,7 +1652,7 @@
       </p:sp>
       <p:sp>
         <p:nvSpPr>
-          <p:cNvPr id="18" name="PlaceHolder 3"/>
+          <p:cNvPr id="16" name="PlaceHolder 3"/>
           <p:cNvSpPr>
             <a:spLocks noGrp="1"/>
           </p:cNvSpPr>
@@ -1689,7 +1689,7 @@
       </p:sp>
       <p:sp>
         <p:nvSpPr>
-          <p:cNvPr id="19" name="PlaceHolder 4"/>
+          <p:cNvPr id="17" name="PlaceHolder 4"/>
           <p:cNvSpPr>
             <a:spLocks noGrp="1"/>
           </p:cNvSpPr>
@@ -1741,7 +1741,7 @@
             <a:pPr>
               <a:defRPr/>
             </a:pPr>
-            <a:fld id="{A65D0D70-5237-4552-B25B-6278AE07EF1E}" type="slidenum">
+            <a:fld id="{471BC995-0F4B-429F-A7C0-7BEF8CD5E4F1}" type="slidenum">
               <a:rPr/>
               <a:t/>
             </a:fld>
@@ -1776,7 +1776,7 @@
       </p:grpSpPr>
       <p:sp>
         <p:nvSpPr>
-          <p:cNvPr id="20" name="PlaceHolder 1"/>
+          <p:cNvPr id="18" name="PlaceHolder 1"/>
           <p:cNvSpPr>
             <a:spLocks noGrp="1"/>
           </p:cNvSpPr>
@@ -1814,7 +1814,7 @@
       </p:sp>
       <p:sp>
         <p:nvSpPr>
-          <p:cNvPr id="21" name="PlaceHolder 2"/>
+          <p:cNvPr id="19" name="PlaceHolder 2"/>
           <p:cNvSpPr>
             <a:spLocks noGrp="1"/>
           </p:cNvSpPr>
@@ -1851,7 +1851,7 @@
       </p:sp>
       <p:sp>
         <p:nvSpPr>
-          <p:cNvPr id="22" name="PlaceHolder 3"/>
+          <p:cNvPr id="20" name="PlaceHolder 3"/>
           <p:cNvSpPr>
             <a:spLocks noGrp="1"/>
           </p:cNvSpPr>
@@ -1888,7 +1888,7 @@
       </p:sp>
       <p:sp>
         <p:nvSpPr>
-          <p:cNvPr id="23" name="PlaceHolder 4"/>
+          <p:cNvPr id="21" name="PlaceHolder 4"/>
           <p:cNvSpPr>
             <a:spLocks noGrp="1"/>
           </p:cNvSpPr>
@@ -1940,7 +1940,7 @@
             <a:pPr>
               <a:defRPr/>
             </a:pPr>
-            <a:fld id="{F739521F-933B-4786-88CA-BC6A37B6D481}" type="slidenum">
+            <a:fld id="{84F85DAD-8107-4112-A10A-0FC2FA97D825}" type="slidenum">
               <a:rPr/>
               <a:t/>
             </a:fld>
@@ -1993,7 +1993,7 @@
         <p:spPr bwMode="auto">
           <a:xfrm>
             <a:off x="9319680" y="7046640"/>
-            <a:ext cx="602640" cy="594000"/>
+            <a:ext cx="602280" cy="593640"/>
           </a:xfrm>
           <a:prstGeom prst="rect">
             <a:avLst/>
@@ -2008,280 +2008,18 @@
             <a:noAutofit/>
           </a:bodyPr>
           <a:lstStyle>
-            <a:lvl1pPr algn="r">
-              <a:lnSpc>
-                <a:spcPct val="100000"/>
-              </a:lnSpc>
-              <a:buNone/>
-              <a:tabLst>
-                <a:tab pos="0" algn="l"/>
-              </a:tabLst>
-              <a:defRPr lang="en" sz="1200" b="0" strike="noStrike" spc="-1">
-                <a:solidFill>
-                  <a:srgbClr val="FFFFFF"/>
-                </a:solidFill>
-                <a:latin typeface="Lato"/>
-                <a:ea typeface="Lato"/>
+            <a:lvl1pPr>
+              <a:defRPr lang="en-US" sz="2400" b="0" strike="noStrike" spc="-1">
+                <a:latin typeface="Times New Roman"/>
               </a:defRPr>
             </a:lvl1pPr>
           </a:lstStyle>
           <a:p>
-            <a:pPr algn="r">
-              <a:lnSpc>
-                <a:spcPct val="100000"/>
-              </a:lnSpc>
-              <a:buNone/>
-              <a:tabLst>
-                <a:tab pos="0" algn="l"/>
-              </a:tabLst>
-              <a:defRPr/>
-            </a:pPr>
-            <a:fld id="{BC65490A-ED5C-4549-89C6-5C823C8FF0A0}" type="slidenum">
-              <a:rPr lang="en" sz="1200" b="0" strike="noStrike" spc="-1">
-                <a:solidFill>
-                  <a:srgbClr val="FFFFFF"/>
-                </a:solidFill>
-                <a:latin typeface="Lato"/>
-                <a:ea typeface="Lato"/>
-              </a:rPr>
-              <a:t/>
-            </a:fld>
-            <a:endParaRPr lang="en-US" sz="1200" b="0" strike="noStrike" spc="-1">
+            <a:pPr>
+              <a:defRPr/>
+            </a:pPr>
+            <a:endParaRPr lang="en-US" sz="2400" b="0" strike="noStrike" spc="-1">
               <a:latin typeface="Times New Roman"/>
-            </a:endParaRPr>
-          </a:p>
-        </p:txBody>
-      </p:sp>
-      <p:sp>
-        <p:nvSpPr>
-          <p:cNvPr id="1" name="PlaceHolder 2"/>
-          <p:cNvSpPr>
-            <a:spLocks noGrp="1"/>
-          </p:cNvSpPr>
-          <p:nvPr>
-            <p:ph type="title"/>
-          </p:nvPr>
-        </p:nvSpPr>
-        <p:spPr bwMode="auto">
-          <a:xfrm>
-            <a:off x="502920" y="309960"/>
-            <a:ext cx="9052200" cy="1297440"/>
-          </a:xfrm>
-          <a:prstGeom prst="rect">
-            <a:avLst/>
-          </a:prstGeom>
-          <a:noFill/>
-          <a:ln w="0">
-            <a:noFill/>
-          </a:ln>
-        </p:spPr>
-        <p:txBody>
-          <a:bodyPr lIns="0" tIns="0" rIns="0" bIns="0" anchor="ctr">
-            <a:noAutofit/>
-          </a:bodyPr>
-          <a:p>
-            <a:pPr algn="ctr">
-              <a:buNone/>
-              <a:defRPr/>
-            </a:pPr>
-            <a:r>
-              <a:rPr lang="en-US" sz="4400" b="0" strike="noStrike" spc="-1">
-                <a:latin typeface="Arial"/>
-              </a:rPr>
-              <a:t>Click to edit the title text format</a:t>
-            </a:r>
-            <a:endParaRPr lang="en-US" sz="4400" b="0" strike="noStrike" spc="-1">
-              <a:latin typeface="Arial"/>
-            </a:endParaRPr>
-          </a:p>
-        </p:txBody>
-      </p:sp>
-      <p:sp>
-        <p:nvSpPr>
-          <p:cNvPr id="2" name="PlaceHolder 3"/>
-          <p:cNvSpPr>
-            <a:spLocks noGrp="1"/>
-          </p:cNvSpPr>
-          <p:nvPr>
-            <p:ph type="body"/>
-          </p:nvPr>
-        </p:nvSpPr>
-        <p:spPr bwMode="auto">
-          <a:xfrm>
-            <a:off x="502920" y="1818720"/>
-            <a:ext cx="9052200" cy="4507560"/>
-          </a:xfrm>
-          <a:prstGeom prst="rect">
-            <a:avLst/>
-          </a:prstGeom>
-          <a:noFill/>
-          <a:ln w="0">
-            <a:noFill/>
-          </a:ln>
-        </p:spPr>
-        <p:txBody>
-          <a:bodyPr lIns="0" tIns="0" rIns="0" bIns="0" anchor="t">
-            <a:normAutofit/>
-          </a:bodyPr>
-          <a:p>
-            <a:pPr marL="432000" indent="-324000">
-              <a:spcBef>
-                <a:spcPts val="1417"/>
-              </a:spcBef>
-              <a:buClr>
-                <a:srgbClr val="FFFFFF"/>
-              </a:buClr>
-              <a:buSzPct val="45000"/>
-              <a:buFont typeface="Wingdings"/>
-              <a:buChar char=""/>
-              <a:defRPr/>
-            </a:pPr>
-            <a:r>
-              <a:rPr lang="en-US" sz="3200" b="0" strike="noStrike" spc="-1">
-                <a:latin typeface="Arial"/>
-              </a:rPr>
-              <a:t>Click to edit the outline text format</a:t>
-            </a:r>
-            <a:endParaRPr lang="en-US" sz="3200" b="0" strike="noStrike" spc="-1">
-              <a:latin typeface="Arial"/>
-            </a:endParaRPr>
-          </a:p>
-          <a:p>
-            <a:pPr marL="864000" lvl="1" indent="-324000">
-              <a:spcBef>
-                <a:spcPts val="1134"/>
-              </a:spcBef>
-              <a:buClr>
-                <a:srgbClr val="FFFFFF"/>
-              </a:buClr>
-              <a:buSzPct val="75000"/>
-              <a:buFont typeface="Symbol"/>
-              <a:buChar char=""/>
-              <a:defRPr/>
-            </a:pPr>
-            <a:r>
-              <a:rPr lang="en-US" sz="2800" b="0" strike="noStrike" spc="-1">
-                <a:latin typeface="Arial"/>
-              </a:rPr>
-              <a:t>Second Outline Level</a:t>
-            </a:r>
-            <a:endParaRPr lang="en-US" sz="2800" b="0" strike="noStrike" spc="-1">
-              <a:latin typeface="Arial"/>
-            </a:endParaRPr>
-          </a:p>
-          <a:p>
-            <a:pPr marL="1296000" lvl="2" indent="-288000">
-              <a:spcBef>
-                <a:spcPts val="850"/>
-              </a:spcBef>
-              <a:buClr>
-                <a:srgbClr val="FFFFFF"/>
-              </a:buClr>
-              <a:buSzPct val="45000"/>
-              <a:buFont typeface="Wingdings"/>
-              <a:buChar char=""/>
-              <a:defRPr/>
-            </a:pPr>
-            <a:r>
-              <a:rPr lang="en-US" sz="2400" b="0" strike="noStrike" spc="-1">
-                <a:latin typeface="Arial"/>
-              </a:rPr>
-              <a:t>Third Outline Level</a:t>
-            </a:r>
-            <a:endParaRPr lang="en-US" sz="2400" b="0" strike="noStrike" spc="-1">
-              <a:latin typeface="Arial"/>
-            </a:endParaRPr>
-          </a:p>
-          <a:p>
-            <a:pPr marL="1728000" lvl="3" indent="-216000">
-              <a:spcBef>
-                <a:spcPts val="567"/>
-              </a:spcBef>
-              <a:buClr>
-                <a:srgbClr val="FFFFFF"/>
-              </a:buClr>
-              <a:buSzPct val="75000"/>
-              <a:buFont typeface="Symbol"/>
-              <a:buChar char=""/>
-              <a:defRPr/>
-            </a:pPr>
-            <a:r>
-              <a:rPr lang="en-US" sz="2000" b="0" strike="noStrike" spc="-1">
-                <a:latin typeface="Arial"/>
-              </a:rPr>
-              <a:t>Fourth Outline Level</a:t>
-            </a:r>
-            <a:endParaRPr lang="en-US" sz="2000" b="0" strike="noStrike" spc="-1">
-              <a:latin typeface="Arial"/>
-            </a:endParaRPr>
-          </a:p>
-          <a:p>
-            <a:pPr marL="2160000" lvl="4" indent="-216000">
-              <a:spcBef>
-                <a:spcPts val="283"/>
-              </a:spcBef>
-              <a:buClr>
-                <a:srgbClr val="FFFFFF"/>
-              </a:buClr>
-              <a:buSzPct val="45000"/>
-              <a:buFont typeface="Wingdings"/>
-              <a:buChar char=""/>
-              <a:defRPr/>
-            </a:pPr>
-            <a:r>
-              <a:rPr lang="en-US" sz="2000" b="0" strike="noStrike" spc="-1">
-                <a:latin typeface="Arial"/>
-              </a:rPr>
-              <a:t>Fifth Outline Level</a:t>
-            </a:r>
-            <a:endParaRPr lang="en-US" sz="2000" b="0" strike="noStrike" spc="-1">
-              <a:latin typeface="Arial"/>
-            </a:endParaRPr>
-          </a:p>
-          <a:p>
-            <a:pPr marL="2592000" lvl="5" indent="-216000">
-              <a:spcBef>
-                <a:spcPts val="283"/>
-              </a:spcBef>
-              <a:buClr>
-                <a:srgbClr val="FFFFFF"/>
-              </a:buClr>
-              <a:buSzPct val="45000"/>
-              <a:buFont typeface="Wingdings"/>
-              <a:buChar char=""/>
-              <a:defRPr/>
-            </a:pPr>
-            <a:r>
-              <a:rPr lang="en-US" sz="2000" b="0" strike="noStrike" spc="-1">
-                <a:latin typeface="Arial"/>
-              </a:rPr>
-              <a:t>Sixth Outline Level</a:t>
-            </a:r>
-            <a:endParaRPr lang="en-US" sz="2000" b="0" strike="noStrike" spc="-1">
-              <a:latin typeface="Arial"/>
-            </a:endParaRPr>
-          </a:p>
-          <a:p>
-            <a:pPr marL="3024000" lvl="6" indent="-216000">
-              <a:spcBef>
-                <a:spcPts val="283"/>
-              </a:spcBef>
-              <a:buClr>
-                <a:srgbClr val="FFFFFF"/>
-              </a:buClr>
-              <a:buSzPct val="45000"/>
-              <a:buFont typeface="Wingdings"/>
-              <a:buChar char=""/>
-              <a:defRPr/>
-            </a:pPr>
-            <a:r>
-              <a:rPr lang="en-US" sz="2000" b="0" strike="noStrike" spc="-1">
-                <a:latin typeface="Arial"/>
-              </a:rPr>
-              <a:t>Seventh Outline Level</a:t>
-            </a:r>
-            <a:endParaRPr lang="en-US" sz="2000" b="0" strike="noStrike" spc="-1">
-              <a:latin typeface="Arial"/>
             </a:endParaRPr>
           </a:p>
         </p:txBody>
@@ -2332,7 +2070,7 @@
       </p:grpSpPr>
       <p:pic>
         <p:nvPicPr>
-          <p:cNvPr id="39" name="Google Shape;138;p13" descr=""/>
+          <p:cNvPr id="37" name="Google Shape;138;p13" descr=""/>
           <p:cNvPicPr/>
           <p:nvPr/>
         </p:nvPicPr>
@@ -2343,7 +2081,7 @@
         <p:spPr bwMode="auto">
           <a:xfrm>
             <a:off x="0" y="228600"/>
-            <a:ext cx="10057320" cy="7315200"/>
+            <a:ext cx="10056960" cy="7314840"/>
           </a:xfrm>
           <a:prstGeom prst="rect">
             <a:avLst/>
@@ -2355,14 +2093,14 @@
       </p:pic>
       <p:sp>
         <p:nvSpPr>
-          <p:cNvPr id="40" name="Google Shape;139;p13"/>
+          <p:cNvPr id="38" name="Google Shape;139;p13"/>
           <p:cNvSpPr/>
           <p:nvPr/>
         </p:nvSpPr>
         <p:spPr bwMode="auto">
           <a:xfrm>
-            <a:off x="1774080" y="3965400"/>
-            <a:ext cx="6508800" cy="852840"/>
+            <a:off x="227862" y="4043956"/>
+            <a:ext cx="9601307" cy="731556"/>
           </a:xfrm>
           <a:prstGeom prst="rect">
             <a:avLst/>
@@ -2394,50 +2132,71 @@
               <a:defRPr/>
             </a:pPr>
             <a:r>
-              <a:rPr lang="en" sz="4400" b="0" strike="noStrike" spc="-1">
+              <a:rPr lang="en" sz="3600" b="0" strike="noStrike" spc="-1">
                 <a:solidFill>
-                  <a:srgbClr val="351C75"/>
+                  <a:srgbClr val="290445"/>
                 </a:solidFill>
                 <a:latin typeface="DejaVu Math TeX Gyre"/>
                 <a:ea typeface="EB Garamond SemiBold"/>
               </a:rPr>
               <a:t>{{StudentName}}</a:t>
             </a:r>
-            <a:endParaRPr lang="en-US" sz="4400" b="0" strike="noStrike" spc="-1">
-              <a:latin typeface="Arial"/>
-            </a:endParaRPr>
-          </a:p>
-        </p:txBody>
-      </p:sp>
-      <p:sp>
-        <p:nvSpPr>
-          <p:cNvPr id="1780191813" name=""/>
-          <p:cNvSpPr txBox="1"/>
+            <a:endParaRPr sz="3600" b="0" strike="noStrike" spc="-1">
+              <a:solidFill>
+                <a:srgbClr val="290445"/>
+              </a:solidFill>
+              <a:latin typeface="Arial"/>
+            </a:endParaRPr>
+          </a:p>
+        </p:txBody>
+      </p:sp>
+      <p:sp>
+        <p:nvSpPr>
+          <p:cNvPr id="39" name=""/>
+          <p:cNvSpPr/>
           <p:nvPr/>
         </p:nvSpPr>
         <p:spPr bwMode="auto">
-          <a:xfrm flipH="0" flipV="0">
-            <a:off x="99200" y="7421861"/>
-            <a:ext cx="4861981" cy="243875"/>
-          </a:xfrm>
-          <a:prstGeom prst="rect">
-            <a:avLst/>
-          </a:prstGeom>
-          <a:noFill/>
-        </p:spPr>
-        <p:txBody>
-          <a:bodyPr vertOverflow="overflow" horzOverflow="overflow" vert="horz" wrap="square" lIns="91440" tIns="45720" rIns="91440" bIns="45720" numCol="1" spcCol="0" rtlCol="0" fromWordArt="0" anchor="t" anchorCtr="0" forceAA="0" upright="0" compatLnSpc="0">
+          <a:xfrm>
+            <a:off x="61666" y="7429122"/>
+            <a:ext cx="4861944" cy="228636"/>
+          </a:xfrm>
+          <a:prstGeom prst="rect">
+            <a:avLst/>
+          </a:prstGeom>
+          <a:noFill/>
+          <a:ln w="0">
+            <a:noFill/>
+          </a:ln>
+        </p:spPr>
+        <p:style>
+          <a:lnRef idx="0"/>
+          <a:fillRef idx="0"/>
+          <a:effectRef idx="0"/>
+          <a:fontRef idx="minor"/>
+        </p:style>
+        <p:txBody>
+          <a:bodyPr vertOverflow="overflow" horzOverflow="overflow" numCol="1" spcCol="0" anchor="t">
             <a:spAutoFit/>
           </a:bodyPr>
           <a:p>
             <a:pPr>
+              <a:lnSpc>
+                <a:spcPct val="100000"/>
+              </a:lnSpc>
+              <a:buNone/>
               <a:defRPr/>
             </a:pPr>
             <a:r>
-              <a:rPr/>
+              <a:rPr lang="en-US" sz="900" b="0" strike="noStrike" spc="-1">
+                <a:latin typeface="Leland Text"/>
+                <a:cs typeface="Leland Text"/>
+              </a:rPr>
               <a:t>{{UID}}</a:t>
             </a:r>
-            <a:endParaRPr/>
+            <a:endParaRPr lang="en-US" sz="1800" b="0" strike="noStrike" spc="-1">
+              <a:latin typeface="Arial"/>
+            </a:endParaRPr>
           </a:p>
         </p:txBody>
       </p:sp>

</xml_diff>

<commit_message>
installed : new library qrcode
</commit_message>
<xml_diff>
--- a/app/cert_gen_sen_app_backend/certificate_data/certificate-template/certificate_of_completion.pptx
+++ b/app/cert_gen_sen_app_backend/certificate_data/certificate-template/certificate_of_completion.pptx
@@ -2197,6 +2197,38 @@
             <a:endParaRPr lang="en-US" sz="1800" b="0" strike="noStrike" spc="-1">
               <a:latin typeface="Arial"/>
             </a:endParaRPr>
+          </a:p>
+        </p:txBody>
+      </p:sp>
+      <p:sp>
+        <p:nvSpPr>
+          <p:cNvPr id="1980709383" name=""/>
+          <p:cNvSpPr txBox="1"/>
+          <p:nvPr/>
+        </p:nvSpPr>
+        <p:spPr bwMode="auto">
+          <a:xfrm flipH="0" flipV="0">
+            <a:off x="9388904" y="7429122"/>
+            <a:ext cx="609138" cy="259115"/>
+          </a:xfrm>
+          <a:prstGeom prst="rect">
+            <a:avLst/>
+          </a:prstGeom>
+          <a:noFill/>
+        </p:spPr>
+        <p:txBody>
+          <a:bodyPr vertOverflow="overflow" horzOverflow="overflow" vert="horz" wrap="square" lIns="91440" tIns="45720" rIns="91440" bIns="45720" numCol="1" spcCol="0" rtlCol="0" fromWordArt="0" anchor="t" anchorCtr="0" forceAA="0" upright="0" compatLnSpc="0">
+            <a:spAutoFit/>
+          </a:bodyPr>
+          <a:p>
+            <a:pPr>
+              <a:defRPr/>
+            </a:pPr>
+            <a:r>
+              <a:rPr sz="1100"/>
+              <a:t>{{QR}}</a:t>
+            </a:r>
+            <a:endParaRPr sz="1100"/>
           </a:p>
         </p:txBody>
       </p:sp>

</xml_diff>

<commit_message>
created : qrcode for certificate
</commit_message>
<xml_diff>
--- a/app/cert_gen_sen_app_backend/certificate_data/certificate-template/certificate_of_completion.pptx
+++ b/app/cert_gen_sen_app_backend/certificate_data/certificate-template/certificate_of_completion.pptx
@@ -46,7 +46,7 @@
             <a:pPr>
               <a:defRPr/>
             </a:pPr>
-            <a:fld id="{9941A90D-FD69-4500-9F9C-4E5FF3E19ED9}" type="slidenum">
+            <a:fld id="{53834214-EADB-49D1-B331-6B02F21D9E77}" type="slidenum">
               <a:rPr/>
               <a:t/>
             </a:fld>
@@ -208,7 +208,7 @@
             <a:pPr>
               <a:defRPr/>
             </a:pPr>
-            <a:fld id="{8E7BF9E7-1E3A-4362-ABA5-BF36FB59DA1E}" type="slidenum">
+            <a:fld id="{529CC5D0-9519-42E9-B981-8DC5CEFDFD53}" type="slidenum">
               <a:rPr/>
               <a:t/>
             </a:fld>
@@ -444,7 +444,7 @@
             <a:pPr>
               <a:defRPr/>
             </a:pPr>
-            <a:fld id="{14708C6A-4798-423A-880F-B8F1DFC9C8EB}" type="slidenum">
+            <a:fld id="{65C98289-6DEC-4CA7-A3DE-D87F22C5B5BD}" type="slidenum">
               <a:rPr/>
               <a:t/>
             </a:fld>
@@ -754,7 +754,7 @@
             <a:pPr>
               <a:defRPr/>
             </a:pPr>
-            <a:fld id="{4E7B5562-01CD-4B01-9D19-3A92295D80C3}" type="slidenum">
+            <a:fld id="{92799867-ECE7-4A1D-AFF4-5D24CED133C1}" type="slidenum">
               <a:rPr/>
               <a:t/>
             </a:fld>
@@ -880,7 +880,7 @@
             <a:pPr>
               <a:defRPr/>
             </a:pPr>
-            <a:fld id="{FDE86794-F3F4-453C-B18A-68612C5D0ABE}" type="slidenum">
+            <a:fld id="{B96F34E1-E368-4886-84EC-60EE3010F656}" type="slidenum">
               <a:rPr/>
               <a:t/>
             </a:fld>
@@ -1005,7 +1005,7 @@
             <a:pPr>
               <a:defRPr/>
             </a:pPr>
-            <a:fld id="{60BAE224-67F8-4119-8434-688263014837}" type="slidenum">
+            <a:fld id="{4CB357DE-077D-476D-AE9C-ED62C62DED64}" type="slidenum">
               <a:rPr/>
               <a:t/>
             </a:fld>
@@ -1167,7 +1167,7 @@
             <a:pPr>
               <a:defRPr/>
             </a:pPr>
-            <a:fld id="{1B7C789E-2441-4E10-8D87-69EB45AA6D9C}" type="slidenum">
+            <a:fld id="{052956F1-0E04-4013-B2BA-49AE316C071A}" type="slidenum">
               <a:rPr/>
               <a:t/>
             </a:fld>
@@ -1255,7 +1255,7 @@
             <a:pPr>
               <a:defRPr/>
             </a:pPr>
-            <a:fld id="{867C4D7A-2162-4FE8-BC59-C72312D29BB7}" type="slidenum">
+            <a:fld id="{B3321398-A7D5-4D0D-BFA7-329C26F34D5E}" type="slidenum">
               <a:rPr/>
               <a:t/>
             </a:fld>
@@ -1343,7 +1343,7 @@
             <a:pPr>
               <a:defRPr/>
             </a:pPr>
-            <a:fld id="{5063E7ED-B2D4-40A1-BCA6-1B71E7C8A1DC}" type="slidenum">
+            <a:fld id="{C330C54E-6719-420F-ABD5-8993CFF1AD71}" type="slidenum">
               <a:rPr/>
               <a:t/>
             </a:fld>
@@ -1542,7 +1542,7 @@
             <a:pPr>
               <a:defRPr/>
             </a:pPr>
-            <a:fld id="{9B7D0471-A22A-485D-B65B-14D5FB701A1E}" type="slidenum">
+            <a:fld id="{208608BE-2EA6-4CF7-92F9-C51325923ADD}" type="slidenum">
               <a:rPr/>
               <a:t/>
             </a:fld>
@@ -1741,7 +1741,7 @@
             <a:pPr>
               <a:defRPr/>
             </a:pPr>
-            <a:fld id="{471BC995-0F4B-429F-A7C0-7BEF8CD5E4F1}" type="slidenum">
+            <a:fld id="{274488A1-637D-426E-90C0-9EE853FCACBE}" type="slidenum">
               <a:rPr/>
               <a:t/>
             </a:fld>
@@ -1940,7 +1940,7 @@
             <a:pPr>
               <a:defRPr/>
             </a:pPr>
-            <a:fld id="{84F85DAD-8107-4112-A10A-0FC2FA97D825}" type="slidenum">
+            <a:fld id="{264C7AC6-E113-4F80-BA35-07AE390D23C1}" type="slidenum">
               <a:rPr/>
               <a:t/>
             </a:fld>
@@ -1993,7 +1993,7 @@
         <p:spPr bwMode="auto">
           <a:xfrm>
             <a:off x="9319680" y="7046640"/>
-            <a:ext cx="602280" cy="593640"/>
+            <a:ext cx="601920" cy="593280"/>
           </a:xfrm>
           <a:prstGeom prst="rect">
             <a:avLst/>
@@ -2081,7 +2081,7 @@
         <p:spPr bwMode="auto">
           <a:xfrm>
             <a:off x="0" y="228600"/>
-            <a:ext cx="10056960" cy="7314840"/>
+            <a:ext cx="10056600" cy="7314480"/>
           </a:xfrm>
           <a:prstGeom prst="rect">
             <a:avLst/>
@@ -2099,8 +2099,8 @@
         </p:nvSpPr>
         <p:spPr bwMode="auto">
           <a:xfrm>
-            <a:off x="227862" y="4043956"/>
-            <a:ext cx="9601307" cy="731556"/>
+            <a:off x="227880" y="4043880"/>
+            <a:ext cx="9600840" cy="731160"/>
           </a:xfrm>
           <a:prstGeom prst="rect">
             <a:avLst/>
@@ -2141,10 +2141,7 @@
               </a:rPr>
               <a:t>{{StudentName}}</a:t>
             </a:r>
-            <a:endParaRPr sz="3600" b="0" strike="noStrike" spc="-1">
-              <a:solidFill>
-                <a:srgbClr val="290445"/>
-              </a:solidFill>
+            <a:endParaRPr lang="en-US" sz="3600" b="0" strike="noStrike" spc="-1">
               <a:latin typeface="Arial"/>
             </a:endParaRPr>
           </a:p>
@@ -2158,8 +2155,8 @@
         </p:nvSpPr>
         <p:spPr bwMode="auto">
           <a:xfrm>
-            <a:off x="61666" y="7429122"/>
-            <a:ext cx="4861944" cy="228636"/>
+            <a:off x="61560" y="7428960"/>
+            <a:ext cx="4861440" cy="226800"/>
           </a:xfrm>
           <a:prstGeom prst="rect">
             <a:avLst/>
@@ -2176,7 +2173,7 @@
           <a:fontRef idx="minor"/>
         </p:style>
         <p:txBody>
-          <a:bodyPr vertOverflow="overflow" horzOverflow="overflow" numCol="1" spcCol="0" anchor="t">
+          <a:bodyPr vertOverflow="overflow" horzOverflow="overflow" lIns="90000" tIns="45000" rIns="90000" bIns="45000" numCol="1" spcCol="0" anchor="t">
             <a:spAutoFit/>
           </a:bodyPr>
           <a:p>
@@ -2189,46 +2186,66 @@
             </a:pPr>
             <a:r>
               <a:rPr lang="en-US" sz="900" b="0" strike="noStrike" spc="-1">
+                <a:solidFill>
+                  <a:srgbClr val="000000"/>
+                </a:solidFill>
                 <a:latin typeface="Leland Text"/>
-                <a:cs typeface="Leland Text"/>
+                <a:ea typeface="DejaVu Sans"/>
               </a:rPr>
               <a:t>{{UID}}</a:t>
             </a:r>
-            <a:endParaRPr lang="en-US" sz="1800" b="0" strike="noStrike" spc="-1">
-              <a:latin typeface="Arial"/>
-            </a:endParaRPr>
-          </a:p>
-        </p:txBody>
-      </p:sp>
-      <p:sp>
-        <p:nvSpPr>
-          <p:cNvPr id="1980709383" name=""/>
-          <p:cNvSpPr txBox="1"/>
+            <a:endParaRPr lang="en-US" sz="900" b="0" strike="noStrike" spc="-1">
+              <a:latin typeface="Arial"/>
+            </a:endParaRPr>
+          </a:p>
+        </p:txBody>
+      </p:sp>
+      <p:sp>
+        <p:nvSpPr>
+          <p:cNvPr id="40" name=""/>
+          <p:cNvSpPr/>
           <p:nvPr/>
         </p:nvSpPr>
         <p:spPr bwMode="auto">
-          <a:xfrm flipH="0" flipV="0">
-            <a:off x="9388904" y="7429122"/>
-            <a:ext cx="609138" cy="259115"/>
-          </a:xfrm>
-          <a:prstGeom prst="rect">
-            <a:avLst/>
-          </a:prstGeom>
-          <a:noFill/>
-        </p:spPr>
-        <p:txBody>
-          <a:bodyPr vertOverflow="overflow" horzOverflow="overflow" vert="horz" wrap="square" lIns="91440" tIns="45720" rIns="91440" bIns="45720" numCol="1" spcCol="0" rtlCol="0" fromWordArt="0" anchor="t" anchorCtr="0" forceAA="0" upright="0" compatLnSpc="0">
+          <a:xfrm>
+            <a:off x="8318193" y="5761973"/>
+            <a:ext cx="608760" cy="258480"/>
+          </a:xfrm>
+          <a:prstGeom prst="rect">
+            <a:avLst/>
+          </a:prstGeom>
+          <a:noFill/>
+          <a:ln w="0">
+            <a:noFill/>
+          </a:ln>
+        </p:spPr>
+        <p:style>
+          <a:lnRef idx="0"/>
+          <a:fillRef idx="0"/>
+          <a:effectRef idx="0"/>
+          <a:fontRef idx="minor"/>
+        </p:style>
+        <p:txBody>
+          <a:bodyPr vertOverflow="overflow" horzOverflow="overflow" numCol="1" spcCol="0" anchor="t">
             <a:spAutoFit/>
           </a:bodyPr>
           <a:p>
             <a:pPr>
+              <a:lnSpc>
+                <a:spcPct val="100000"/>
+              </a:lnSpc>
+              <a:buNone/>
               <a:defRPr/>
             </a:pPr>
             <a:r>
-              <a:rPr sz="1100"/>
+              <a:rPr lang="en-US" sz="1100" b="0" strike="noStrike" spc="-1">
+                <a:latin typeface="Arial"/>
+              </a:rPr>
               <a:t>{{QR}}</a:t>
             </a:r>
-            <a:endParaRPr sz="1100"/>
+            <a:endParaRPr lang="en-US" sz="1100" b="0" strike="noStrike" spc="-1">
+              <a:latin typeface="Arial"/>
+            </a:endParaRPr>
           </a:p>
         </p:txBody>
       </p:sp>

</xml_diff>